<commit_message>
Small changes in documentation and services
Signed-off-by: Borlay Dániel <borlay.daniel@gmail.com>
</commit_message>
<xml_diff>
--- a/microservice.pptx
+++ b/microservice.pptx
@@ -142,7 +142,7 @@
       </p14:sectionLst>
     </p:ext>
     <p:ext uri="{EFAFB233-063F-42B5-8137-9DF3F51BA10A}">
-      <p15:sldGuideLst xmlns:p15="http://schemas.microsoft.com/office/powerpoint/2012/main" xmlns="">
+      <p15:sldGuideLst xmlns:p15="http://schemas.microsoft.com/office/powerpoint/2012/main">
         <p15:guide id="1" orient="horz" pos="2136" userDrawn="1">
           <p15:clr>
             <a:srgbClr val="A4A3A4"/>
@@ -156,7 +156,18 @@
       </p15:sldGuideLst>
     </p:ext>
     <p:ext uri="{2D200454-40CA-4A62-9FC3-DE9A4176ACB9}">
-      <p15:notesGuideLst xmlns:p15="http://schemas.microsoft.com/office/powerpoint/2012/main" xmlns=""/>
+      <p15:notesGuideLst xmlns:p15="http://schemas.microsoft.com/office/powerpoint/2012/main">
+        <p15:guide id="1" orient="horz" pos="2880">
+          <p15:clr>
+            <a:srgbClr val="A4A3A4"/>
+          </p15:clr>
+        </p15:guide>
+        <p15:guide id="2" pos="2160">
+          <p15:clr>
+            <a:srgbClr val="A4A3A4"/>
+          </p15:clr>
+        </p15:guide>
+      </p15:notesGuideLst>
     </p:ext>
   </p:extLst>
 </p:presentation>
@@ -244,7 +255,7 @@
           <a:p>
             <a:fld id="{D320DF98-73A7-40A6-8A84-2EB5B4F2C4CC}" type="datetimeFigureOut">
               <a:rPr lang="hu-HU" smtClean="0"/>
-              <a:t>2016.05.16.</a:t>
+              <a:t>2016. 05. 15.</a:t>
             </a:fld>
             <a:endParaRPr lang="hu-HU"/>
           </a:p>
@@ -410,7 +421,7 @@
             <a:fld id="{B9130191-0BE1-0142-AFC1-0297AE024A0E}" type="datetimeFigureOut">
               <a:rPr lang="en-US" smtClean="0"/>
               <a:pPr/>
-              <a:t>5/16/2016</a:t>
+              <a:t>5/15/2016</a:t>
             </a:fld>
             <a:endParaRPr lang="en-US"/>
           </a:p>
@@ -965,16 +976,6 @@
               </a:rPr>
               <a:t>Budapest University of Technology and Economics</a:t>
             </a:r>
-            <a:r>
-              <a:rPr lang="hu-HU" sz="1000" b="1" dirty="0">
-                <a:solidFill>
-                  <a:schemeClr val="bg1"/>
-                </a:solidFill>
-                <a:latin typeface="+mn-lt"/>
-                <a:cs typeface="+mn-cs"/>
-              </a:rPr>
-              <a:t/>
-            </a:r>
             <a:br>
               <a:rPr lang="hu-HU" sz="1000" b="1" dirty="0">
                 <a:solidFill>
@@ -1319,13 +1320,6 @@
               </a:rPr>
               <a:t>Economics</a:t>
             </a:r>
-            <a:r>
-              <a:rPr lang="hu-HU" sz="2400" b="1" dirty="0">
-                <a:latin typeface="+mn-lt"/>
-                <a:cs typeface="+mn-cs"/>
-              </a:rPr>
-              <a:t/>
-            </a:r>
             <a:br>
               <a:rPr lang="hu-HU" sz="2400" b="1" dirty="0">
                 <a:latin typeface="+mn-lt"/>
@@ -3118,13 +3112,6 @@
               </a:rPr>
               <a:t>Economics</a:t>
             </a:r>
-            <a:r>
-              <a:rPr lang="hu-HU" sz="2400" b="1" dirty="0">
-                <a:latin typeface="+mn-lt"/>
-                <a:cs typeface="+mn-cs"/>
-              </a:rPr>
-              <a:t/>
-            </a:r>
             <a:br>
               <a:rPr lang="hu-HU" sz="2400" b="1" dirty="0">
                 <a:latin typeface="+mn-lt"/>
@@ -3378,16 +3365,6 @@
                 <a:cs typeface="+mn-cs"/>
               </a:rPr>
               <a:t>Budapest University of Technology and Economics</a:t>
-            </a:r>
-            <a:r>
-              <a:rPr lang="hu-HU" sz="1000" b="1" dirty="0">
-                <a:solidFill>
-                  <a:schemeClr val="tx1"/>
-                </a:solidFill>
-                <a:latin typeface="+mn-lt"/>
-                <a:cs typeface="+mn-cs"/>
-              </a:rPr>
-              <a:t/>
             </a:r>
             <a:br>
               <a:rPr lang="hu-HU" sz="1000" b="1" dirty="0">
@@ -6011,15 +5988,15 @@
           <a:lstStyle/>
           <a:p>
             <a:r>
-              <a:rPr lang="en-US" dirty="0" err="1" smtClean="0"/>
+              <a:rPr lang="en-US" dirty="0" err="1"/>
               <a:t>Diplomaterv</a:t>
             </a:r>
             <a:r>
-              <a:rPr lang="en-US" dirty="0" smtClean="0"/>
+              <a:rPr lang="en-US" dirty="0"/>
               <a:t> </a:t>
             </a:r>
             <a:r>
-              <a:rPr lang="en-US" dirty="0" err="1" smtClean="0"/>
+              <a:rPr lang="en-US" dirty="0" err="1"/>
               <a:t>céljai</a:t>
             </a:r>
             <a:endParaRPr lang="en-US" dirty="0"/>
@@ -6042,230 +6019,230 @@
           <a:lstStyle/>
           <a:p>
             <a:r>
-              <a:rPr lang="en-US" sz="2800" dirty="0" err="1" smtClean="0"/>
+              <a:rPr lang="en-US" sz="2800" dirty="0" err="1"/>
               <a:t>Mikroszolgáltatások</a:t>
             </a:r>
             <a:r>
-              <a:rPr lang="en-US" sz="2800" dirty="0" smtClean="0"/>
+              <a:rPr lang="en-US" sz="2800" dirty="0"/>
               <a:t> </a:t>
             </a:r>
             <a:r>
-              <a:rPr lang="en-US" sz="2800" dirty="0" err="1" smtClean="0"/>
+              <a:rPr lang="en-US" sz="2800" dirty="0" err="1"/>
               <a:t>architektúra</a:t>
             </a:r>
             <a:r>
-              <a:rPr lang="en-US" sz="2800" dirty="0" smtClean="0"/>
+              <a:rPr lang="en-US" sz="2800" dirty="0"/>
               <a:t> </a:t>
             </a:r>
             <a:r>
-              <a:rPr lang="en-US" sz="2800" dirty="0" err="1" smtClean="0"/>
+              <a:rPr lang="en-US" sz="2800" dirty="0" err="1"/>
               <a:t>megismerése</a:t>
             </a:r>
             <a:r>
-              <a:rPr lang="en-US" sz="2800" dirty="0" smtClean="0"/>
+              <a:rPr lang="en-US" sz="2800" dirty="0"/>
               <a:t>/</a:t>
             </a:r>
             <a:r>
-              <a:rPr lang="en-US" sz="2800" dirty="0" err="1" smtClean="0"/>
+              <a:rPr lang="en-US" sz="2800" dirty="0" err="1"/>
               <a:t>bemutatása</a:t>
             </a:r>
-            <a:endParaRPr lang="en-US" sz="2800" dirty="0" smtClean="0"/>
-          </a:p>
-          <a:p>
-            <a:r>
-              <a:rPr lang="en-US" sz="2800" dirty="0" err="1" smtClean="0"/>
+            <a:endParaRPr lang="en-US" sz="2800" dirty="0"/>
+          </a:p>
+          <a:p>
+            <a:r>
+              <a:rPr lang="en-US" sz="2800" dirty="0" err="1"/>
               <a:t>Architektúra</a:t>
             </a:r>
             <a:r>
-              <a:rPr lang="en-US" sz="2800" dirty="0" smtClean="0"/>
+              <a:rPr lang="en-US" sz="2800" dirty="0"/>
               <a:t> </a:t>
             </a:r>
             <a:r>
-              <a:rPr lang="en-US" sz="2800" dirty="0" err="1" smtClean="0"/>
+              <a:rPr lang="en-US" sz="2800" dirty="0" err="1"/>
               <a:t>előnyeinek</a:t>
             </a:r>
             <a:r>
-              <a:rPr lang="en-US" sz="2800" dirty="0" smtClean="0"/>
+              <a:rPr lang="en-US" sz="2800" dirty="0"/>
               <a:t> </a:t>
             </a:r>
             <a:r>
-              <a:rPr lang="en-US" sz="2800" dirty="0" err="1" smtClean="0"/>
+              <a:rPr lang="en-US" sz="2800" dirty="0" err="1"/>
               <a:t>és</a:t>
             </a:r>
             <a:r>
-              <a:rPr lang="en-US" sz="2800" dirty="0" smtClean="0"/>
+              <a:rPr lang="en-US" sz="2800" dirty="0"/>
               <a:t> </a:t>
             </a:r>
             <a:r>
-              <a:rPr lang="en-US" sz="2800" dirty="0" err="1" smtClean="0"/>
+              <a:rPr lang="en-US" sz="2800" dirty="0" err="1"/>
               <a:t>hátrányainak</a:t>
             </a:r>
             <a:r>
-              <a:rPr lang="en-US" sz="2800" dirty="0" smtClean="0"/>
+              <a:rPr lang="en-US" sz="2800" dirty="0"/>
               <a:t> </a:t>
             </a:r>
             <a:r>
-              <a:rPr lang="en-US" sz="2800" dirty="0" err="1" smtClean="0"/>
+              <a:rPr lang="en-US" sz="2800" dirty="0" err="1"/>
               <a:t>az</a:t>
             </a:r>
             <a:r>
-              <a:rPr lang="en-US" sz="2800" dirty="0" smtClean="0"/>
+              <a:rPr lang="en-US" sz="2800" dirty="0"/>
               <a:t> </a:t>
             </a:r>
             <a:r>
-              <a:rPr lang="en-US" sz="2800" dirty="0" err="1" smtClean="0"/>
+              <a:rPr lang="en-US" sz="2800" dirty="0" err="1"/>
               <a:t>elemzése</a:t>
             </a:r>
-            <a:endParaRPr lang="en-US" sz="2800" dirty="0" smtClean="0"/>
-          </a:p>
-          <a:p>
-            <a:r>
-              <a:rPr lang="en-US" sz="2800" dirty="0" err="1" smtClean="0"/>
+            <a:endParaRPr lang="en-US" sz="2800" dirty="0"/>
+          </a:p>
+          <a:p>
+            <a:r>
+              <a:rPr lang="en-US" sz="2800" dirty="0" err="1"/>
               <a:t>Szokásos</a:t>
             </a:r>
             <a:r>
-              <a:rPr lang="en-US" sz="2800" dirty="0" smtClean="0"/>
+              <a:rPr lang="en-US" sz="2800" dirty="0"/>
               <a:t> </a:t>
             </a:r>
             <a:r>
-              <a:rPr lang="en-US" sz="2800" dirty="0" err="1" smtClean="0"/>
+              <a:rPr lang="en-US" sz="2800" dirty="0" err="1"/>
               <a:t>technol</a:t>
             </a:r>
             <a:r>
-              <a:rPr lang="hu-HU" sz="2800" dirty="0" smtClean="0"/>
+              <a:rPr lang="hu-HU" sz="2800" dirty="0"/>
               <a:t>ó</a:t>
             </a:r>
             <a:r>
-              <a:rPr lang="en-US" sz="2800" dirty="0" err="1" smtClean="0"/>
+              <a:rPr lang="en-US" sz="2800" dirty="0" err="1"/>
               <a:t>giák</a:t>
             </a:r>
             <a:r>
-              <a:rPr lang="en-US" sz="2800" dirty="0" smtClean="0"/>
+              <a:rPr lang="en-US" sz="2800" dirty="0"/>
               <a:t> </a:t>
             </a:r>
             <a:r>
-              <a:rPr lang="en-US" sz="2800" dirty="0" err="1" smtClean="0"/>
+              <a:rPr lang="en-US" sz="2800" dirty="0" err="1"/>
               <a:t>bemutatása</a:t>
             </a:r>
-            <a:endParaRPr lang="en-US" sz="2800" dirty="0" smtClean="0"/>
-          </a:p>
-          <a:p>
-            <a:r>
-              <a:rPr lang="en-US" sz="2800" dirty="0" err="1" smtClean="0"/>
+            <a:endParaRPr lang="en-US" sz="2800" dirty="0"/>
+          </a:p>
+          <a:p>
+            <a:r>
+              <a:rPr lang="en-US" sz="2800" dirty="0" err="1"/>
               <a:t>Folytonos</a:t>
             </a:r>
             <a:r>
-              <a:rPr lang="en-US" sz="2800" dirty="0" smtClean="0"/>
+              <a:rPr lang="en-US" sz="2800" dirty="0"/>
               <a:t> </a:t>
             </a:r>
             <a:r>
-              <a:rPr lang="en-US" sz="2800" dirty="0" err="1" smtClean="0"/>
+              <a:rPr lang="en-US" sz="2800" dirty="0" err="1"/>
               <a:t>integráci</a:t>
             </a:r>
             <a:r>
-              <a:rPr lang="hu-HU" sz="2800" dirty="0" smtClean="0"/>
+              <a:rPr lang="hu-HU" sz="2800" dirty="0"/>
               <a:t>ó</a:t>
             </a:r>
             <a:r>
-              <a:rPr lang="en-US" sz="2800" dirty="0" smtClean="0"/>
+              <a:rPr lang="en-US" sz="2800" dirty="0"/>
               <a:t> </a:t>
             </a:r>
             <a:r>
-              <a:rPr lang="en-US" sz="2800" dirty="0" err="1" smtClean="0"/>
+              <a:rPr lang="en-US" sz="2800" dirty="0" err="1"/>
               <a:t>felhasználásával</a:t>
             </a:r>
             <a:r>
-              <a:rPr lang="en-US" sz="2800" dirty="0" smtClean="0"/>
+              <a:rPr lang="en-US" sz="2800" dirty="0"/>
               <a:t> </a:t>
             </a:r>
             <a:r>
-              <a:rPr lang="en-US" sz="2800" dirty="0" err="1" smtClean="0"/>
+              <a:rPr lang="en-US" sz="2800" dirty="0" err="1"/>
               <a:t>automatikus</a:t>
             </a:r>
             <a:r>
-              <a:rPr lang="en-US" sz="2800" dirty="0" smtClean="0"/>
+              <a:rPr lang="en-US" sz="2800" dirty="0"/>
               <a:t> </a:t>
             </a:r>
             <a:r>
-              <a:rPr lang="en-US" sz="2800" dirty="0" err="1" smtClean="0"/>
+              <a:rPr lang="en-US" sz="2800" dirty="0" err="1"/>
               <a:t>telepitéshez</a:t>
             </a:r>
             <a:r>
-              <a:rPr lang="en-US" sz="2800" dirty="0" smtClean="0"/>
+              <a:rPr lang="en-US" sz="2800" dirty="0"/>
               <a:t> </a:t>
             </a:r>
             <a:r>
-              <a:rPr lang="en-US" sz="2800" dirty="0" err="1" smtClean="0"/>
+              <a:rPr lang="en-US" sz="2800" dirty="0" err="1"/>
               <a:t>keretrendszer</a:t>
             </a:r>
             <a:r>
-              <a:rPr lang="en-US" sz="2800" dirty="0" smtClean="0"/>
+              <a:rPr lang="en-US" sz="2800" dirty="0"/>
               <a:t> </a:t>
             </a:r>
             <a:r>
-              <a:rPr lang="en-US" sz="2800" dirty="0" err="1" smtClean="0"/>
+              <a:rPr lang="en-US" sz="2800" dirty="0" err="1"/>
               <a:t>tervezése</a:t>
             </a:r>
-            <a:endParaRPr lang="en-US" sz="2800" dirty="0" smtClean="0"/>
-          </a:p>
-          <a:p>
-            <a:r>
-              <a:rPr lang="en-US" sz="2800" dirty="0" err="1" smtClean="0"/>
+            <a:endParaRPr lang="en-US" sz="2800" dirty="0"/>
+          </a:p>
+          <a:p>
+            <a:r>
+              <a:rPr lang="en-US" sz="2800" dirty="0" err="1"/>
               <a:t>Megtervezett</a:t>
             </a:r>
             <a:r>
-              <a:rPr lang="en-US" sz="2800" dirty="0" smtClean="0"/>
+              <a:rPr lang="en-US" sz="2800" dirty="0"/>
               <a:t> </a:t>
             </a:r>
             <a:r>
-              <a:rPr lang="en-US" sz="2800" dirty="0" err="1" smtClean="0"/>
+              <a:rPr lang="en-US" sz="2800" dirty="0" err="1"/>
               <a:t>keretrendszer</a:t>
             </a:r>
             <a:r>
-              <a:rPr lang="en-US" sz="2800" dirty="0" smtClean="0"/>
+              <a:rPr lang="en-US" sz="2800" dirty="0"/>
               <a:t> </a:t>
             </a:r>
             <a:r>
-              <a:rPr lang="en-US" sz="2800" dirty="0" err="1" smtClean="0"/>
+              <a:rPr lang="en-US" sz="2800" dirty="0" err="1"/>
               <a:t>elkészitése</a:t>
             </a:r>
-            <a:endParaRPr lang="en-US" sz="2800" dirty="0" smtClean="0"/>
-          </a:p>
-          <a:p>
-            <a:r>
-              <a:rPr lang="en-US" sz="2800" dirty="0" err="1" smtClean="0"/>
+            <a:endParaRPr lang="en-US" sz="2800" dirty="0"/>
+          </a:p>
+          <a:p>
+            <a:r>
+              <a:rPr lang="en-US" sz="2800" dirty="0" err="1"/>
               <a:t>Elkészitett</a:t>
             </a:r>
             <a:r>
-              <a:rPr lang="en-US" sz="2800" dirty="0" smtClean="0"/>
+              <a:rPr lang="en-US" sz="2800" dirty="0"/>
               <a:t> </a:t>
             </a:r>
             <a:r>
-              <a:rPr lang="en-US" sz="2800" dirty="0" err="1" smtClean="0"/>
+              <a:rPr lang="en-US" sz="2800" dirty="0" err="1"/>
               <a:t>keretrendszer</a:t>
             </a:r>
             <a:r>
-              <a:rPr lang="en-US" sz="2800" dirty="0" smtClean="0"/>
+              <a:rPr lang="en-US" sz="2800" dirty="0"/>
               <a:t> </a:t>
             </a:r>
             <a:r>
-              <a:rPr lang="en-US" sz="2800" dirty="0" err="1" smtClean="0"/>
+              <a:rPr lang="en-US" sz="2800" dirty="0" err="1"/>
               <a:t>kielemzése</a:t>
             </a:r>
             <a:r>
-              <a:rPr lang="en-US" sz="2800" dirty="0" smtClean="0"/>
+              <a:rPr lang="en-US" sz="2800" dirty="0"/>
               <a:t> (</a:t>
             </a:r>
             <a:r>
-              <a:rPr lang="en-US" sz="2800" dirty="0" err="1" smtClean="0"/>
+              <a:rPr lang="en-US" sz="2800" dirty="0" err="1"/>
               <a:t>előnyei</a:t>
             </a:r>
             <a:r>
-              <a:rPr lang="en-US" sz="2800" dirty="0" smtClean="0"/>
+              <a:rPr lang="en-US" sz="2800" dirty="0"/>
               <a:t> </a:t>
             </a:r>
             <a:r>
-              <a:rPr lang="en-US" sz="2800" smtClean="0"/>
+              <a:rPr lang="en-US" sz="2800"/>
               <a:t>hátránya)</a:t>
             </a:r>
             <a:endParaRPr lang="hu-HU" sz="2800" dirty="0"/>
@@ -6393,7 +6370,7 @@
             <a:pPr lvl="1"/>
             <a:r>
               <a:rPr lang="hu-HU" dirty="0"/>
-              <a:t>Más ipari implementációk tanulmányozása</a:t>
+              <a:t>Más nyílt forrású implementációk tanulmányozása</a:t>
             </a:r>
           </a:p>
           <a:p>
@@ -6721,7 +6698,7 @@
           <a:p>
             <a:r>
               <a:rPr lang="hu-HU" dirty="0"/>
-              <a:t>Könnyen fejleszthető csapatban</a:t>
+              <a:t>Könnyen fejleszthető csapatokban</a:t>
             </a:r>
           </a:p>
           <a:p>
@@ -6853,12 +6830,8 @@
           </a:p>
           <a:p>
             <a:r>
-              <a:rPr lang="hu-HU" dirty="0" err="1"/>
-              <a:t>Azsinkron</a:t>
-            </a:r>
-            <a:r>
               <a:rPr lang="hu-HU" dirty="0"/>
-              <a:t> működés</a:t>
+              <a:t>Aszinkron működés</a:t>
             </a:r>
           </a:p>
           <a:p>
@@ -7107,56 +7080,15 @@
           </a:p>
         </p:txBody>
       </p:sp>
-      <p:sp>
-        <p:nvSpPr>
-          <p:cNvPr id="3" name="Tartalom helye 2"/>
-          <p:cNvSpPr>
-            <a:spLocks noGrp="1"/>
-          </p:cNvSpPr>
+      <p:pic>
+        <p:nvPicPr>
+          <p:cNvPr id="6" name="Tartalom helye 5"/>
+          <p:cNvPicPr>
+            <a:picLocks noGrp="1" noChangeAspect="1"/>
+          </p:cNvPicPr>
           <p:nvPr>
             <p:ph idx="1"/>
           </p:nvPr>
-        </p:nvSpPr>
-        <p:spPr/>
-        <p:txBody>
-          <a:bodyPr/>
-          <a:lstStyle/>
-          <a:p>
-            <a:endParaRPr lang="hu-HU" dirty="0"/>
-          </a:p>
-        </p:txBody>
-      </p:sp>
-      <p:sp>
-        <p:nvSpPr>
-          <p:cNvPr id="4" name="Dia számának helye 3"/>
-          <p:cNvSpPr>
-            <a:spLocks noGrp="1"/>
-          </p:cNvSpPr>
-          <p:nvPr>
-            <p:ph type="sldNum" sz="quarter" idx="10"/>
-          </p:nvPr>
-        </p:nvSpPr>
-        <p:spPr/>
-        <p:txBody>
-          <a:bodyPr/>
-          <a:lstStyle/>
-          <a:p>
-            <a:fld id="{A7C85712-A09B-4560-9D1E-08050AA835BB}" type="slidenum">
-              <a:rPr lang="hu-HU" smtClean="0"/>
-              <a:pPr/>
-              <a:t>8</a:t>
-            </a:fld>
-            <a:endParaRPr lang="hu-HU" dirty="0"/>
-          </a:p>
-        </p:txBody>
-      </p:sp>
-      <p:pic>
-        <p:nvPicPr>
-          <p:cNvPr id="5" name="Kép 4"/>
-          <p:cNvPicPr>
-            <a:picLocks noChangeAspect="1"/>
-          </p:cNvPicPr>
-          <p:nvPr/>
         </p:nvPicPr>
         <p:blipFill>
           <a:blip r:embed="rId2"/>
@@ -7166,14 +7098,35 @@
         </p:blipFill>
         <p:spPr>
           <a:xfrm>
-            <a:off x="0" y="1476375"/>
-            <a:ext cx="9144000" cy="3905250"/>
+            <a:off x="-48026" y="1045029"/>
+            <a:ext cx="9192026" cy="4999511"/>
           </a:xfrm>
-          <a:prstGeom prst="rect">
-            <a:avLst/>
-          </a:prstGeom>
         </p:spPr>
       </p:pic>
+      <p:sp>
+        <p:nvSpPr>
+          <p:cNvPr id="4" name="Dia számának helye 3"/>
+          <p:cNvSpPr>
+            <a:spLocks noGrp="1"/>
+          </p:cNvSpPr>
+          <p:nvPr>
+            <p:ph type="sldNum" sz="quarter" idx="10"/>
+          </p:nvPr>
+        </p:nvSpPr>
+        <p:spPr/>
+        <p:txBody>
+          <a:bodyPr/>
+          <a:lstStyle/>
+          <a:p>
+            <a:fld id="{A7C85712-A09B-4560-9D1E-08050AA835BB}" type="slidenum">
+              <a:rPr lang="hu-HU" smtClean="0"/>
+              <a:pPr/>
+              <a:t>8</a:t>
+            </a:fld>
+            <a:endParaRPr lang="hu-HU" dirty="0"/>
+          </a:p>
+        </p:txBody>
+      </p:sp>
     </p:spTree>
     <p:extLst>
       <p:ext uri="{BB962C8B-B14F-4D97-AF65-F5344CB8AC3E}">
@@ -8881,7 +8834,7 @@
   <a:extraClrSchemeLst/>
   <a:extLst>
     <a:ext uri="{05A4C25C-085E-4340-85A3-A5531E510DB2}">
-      <thm15:themeFamily xmlns:thm15="http://schemas.microsoft.com/office/thememl/2012/main" xmlns="" name="Office Theme" id="{62F939B6-93AF-4DB8-9C6B-D6C7DFDC589F}" vid="{4A3C46E8-61CC-4603-A589-7422A47A8E4A}"/>
+      <thm15:themeFamily xmlns:thm15="http://schemas.microsoft.com/office/thememl/2012/main" name="Office Theme" id="{62F939B6-93AF-4DB8-9C6B-D6C7DFDC589F}" vid="{4A3C46E8-61CC-4603-A589-7422A47A8E4A}"/>
     </a:ext>
   </a:extLst>
 </a:theme>

</xml_diff>